<commit_message>
Added changes in ppt presentation
</commit_message>
<xml_diff>
--- a/Power point presentation/Box_Office_Trend_Analysis.pptx
+++ b/Power point presentation/Box_Office_Trend_Analysis.pptx
@@ -135,7 +135,7 @@
 <file path=ppt/revisionInfo.xml><?xml version="1.0" encoding="utf-8"?>
 <p1510:revInfo xmlns:a="http://schemas.openxmlformats.org/drawingml/2006/main" xmlns:r="http://schemas.openxmlformats.org/officeDocument/2006/relationships" xmlns:p1510="http://schemas.microsoft.com/office/powerpoint/2015/10/main">
   <p1510:revLst>
-    <p1510:client id="{1B1FD478-E132-72B1-C041-265095A08381}" v="51" dt="2025-01-19T16:48:35.354"/>
+    <p1510:client id="{1B1FD478-E132-72B1-C041-265095A08381}" v="97" dt="2025-01-19T18:01:57.001"/>
     <p1510:client id="{369C0000-B67C-E4FA-5F95-9E8530BC51D3}" v="1661" dt="2025-01-19T15:35:10.078"/>
     <p1510:client id="{A6FBA7C1-4F51-D923-2699-2290B60AEDEF}" v="176" dt="2025-01-19T16:34:23.169"/>
     <p1510:client id="{F370823B-E1FE-0D79-AF81-FDE3EE1AF83C}" v="44" dt="2025-01-19T16:08:53.418"/>
@@ -11753,8 +11753,8 @@
         </p:nvSpPr>
         <p:spPr>
           <a:xfrm>
-            <a:off x="1404834" y="2473574"/>
-            <a:ext cx="9371161" cy="2554545"/>
+            <a:off x="1160419" y="2564246"/>
+            <a:ext cx="9371161" cy="2677656"/>
           </a:xfrm>
           <a:prstGeom prst="rect">
             <a:avLst/>
@@ -11775,7 +11775,7 @@
               <a:buChar char="•"/>
             </a:pPr>
             <a:r>
-              <a:rPr lang="en-US" sz="3200" dirty="0">
+              <a:rPr lang="en-US" sz="2800" dirty="0">
                 <a:solidFill>
                   <a:schemeClr val="accent5">
                     <a:lumMod val="76000"/>
@@ -11794,7 +11794,7 @@
               </a:rPr>
               <a:t>amani.mkaya@student.moringaschool.com</a:t>
             </a:r>
-            <a:endParaRPr lang="en-US" sz="3200">
+            <a:endParaRPr lang="en-US" sz="2800">
               <a:solidFill>
                 <a:schemeClr val="accent5">
                   <a:lumMod val="76000"/>
@@ -11811,7 +11811,7 @@
               <a:buChar char="•"/>
             </a:pPr>
             <a:r>
-              <a:rPr lang="en-US" sz="3200" dirty="0">
+              <a:rPr lang="en-US" sz="2800" dirty="0">
                 <a:solidFill>
                   <a:schemeClr val="accent5">
                     <a:lumMod val="76000"/>
@@ -11830,7 +11830,7 @@
               </a:rPr>
               <a:t>rodgers.ndemo@student.moringaschool.com</a:t>
             </a:r>
-            <a:endParaRPr lang="en-US" sz="3200">
+            <a:endParaRPr lang="en-US" sz="2800">
               <a:solidFill>
                 <a:schemeClr val="accent5">
                   <a:lumMod val="76000"/>
@@ -11847,7 +11847,7 @@
               <a:buChar char="•"/>
             </a:pPr>
             <a:r>
-              <a:rPr lang="en-US" sz="3200" dirty="0">
+              <a:rPr lang="en-US" sz="2800" dirty="0">
                 <a:solidFill>
                   <a:schemeClr val="accent5">
                     <a:lumMod val="76000"/>
@@ -11866,7 +11866,7 @@
               </a:rPr>
               <a:t>adnanahmedmohamund1@gmail.com</a:t>
             </a:r>
-            <a:endParaRPr lang="en-US" sz="3200">
+            <a:endParaRPr lang="en-US" sz="2800">
               <a:solidFill>
                 <a:schemeClr val="accent5">
                   <a:lumMod val="76000"/>
@@ -11883,7 +11883,7 @@
               <a:buChar char="•"/>
             </a:pPr>
             <a:r>
-              <a:rPr lang="en-US" sz="3200" dirty="0">
+              <a:rPr lang="en-US" sz="2800" dirty="0">
                 <a:solidFill>
                   <a:schemeClr val="accent5">
                     <a:lumMod val="76000"/>
@@ -11902,7 +11902,7 @@
               </a:rPr>
               <a:t>kiprono.bett@student.moringaschool.com</a:t>
             </a:r>
-            <a:endParaRPr lang="en-US" sz="3200">
+            <a:endParaRPr lang="en-US" sz="2800">
               <a:solidFill>
                 <a:schemeClr val="accent5">
                   <a:lumMod val="76000"/>
@@ -11919,7 +11919,7 @@
               <a:buChar char="•"/>
             </a:pPr>
             <a:r>
-              <a:rPr lang="en-US" sz="3200" dirty="0">
+              <a:rPr lang="en-US" sz="2800" dirty="0">
                 <a:solidFill>
                   <a:schemeClr val="accent5">
                     <a:lumMod val="76000"/>
@@ -11938,20 +11938,35 @@
               </a:rPr>
               <a:t>beverlyne.langat@student.moringaschool.com</a:t>
             </a:r>
-            <a:endParaRPr lang="en-US" sz="3200">
+            <a:endParaRPr lang="en-US" sz="2800">
               <a:solidFill>
                 <a:schemeClr val="accent5">
                   <a:lumMod val="76000"/>
                 </a:schemeClr>
               </a:solidFill>
-              <a:hlinkClick r:id="rId6">
-                <a:extLst>
-                  <a:ext uri="{A12FA001-AC4F-418D-AE19-62706E023703}">
-                    <ahyp:hlinkClr xmlns:ahyp="http://schemas.microsoft.com/office/drawing/2018/hyperlinkcolor" val="tx"/>
-                  </a:ext>
-                </a:extLst>
-              </a:hlinkClick>
+              <a:latin typeface="Calibri"/>
+              <a:ea typeface="Calibri"/>
+              <a:cs typeface="Calibri"/>
             </a:endParaRPr>
+          </a:p>
+          <a:p>
+            <a:pPr marL="285750" indent="-285750" algn="ctr">
+              <a:buFont typeface="Arial"/>
+              <a:buChar char="•"/>
+            </a:pPr>
+            <a:r>
+              <a:rPr lang="en-US" sz="2800" dirty="0">
+                <a:solidFill>
+                  <a:schemeClr val="accent5">
+                    <a:lumMod val="76000"/>
+                  </a:schemeClr>
+                </a:solidFill>
+                <a:latin typeface="Calibri"/>
+                <a:ea typeface="Calibri"/>
+                <a:cs typeface="Calibri"/>
+              </a:rPr>
+              <a:t>betsy.gitije@student.moringaschool.com</a:t>
+            </a:r>
           </a:p>
         </p:txBody>
       </p:sp>

</xml_diff>